<commit_message>
adds contact, new photos
</commit_message>
<xml_diff>
--- a/logo/brand.pptx
+++ b/logo/brand.pptx
@@ -3823,64 +3823,12 @@
           <a:chExt cx="0" cy="0"/>
         </a:xfrm>
       </p:grpSpPr>
-      <p:sp>
-        <p:nvSpPr>
-          <p:cNvPr id="2" name="Rectangle 1">
-            <a:extLst>
-              <a:ext uri="{FF2B5EF4-FFF2-40B4-BE49-F238E27FC236}">
-                <a16:creationId xmlns:a16="http://schemas.microsoft.com/office/drawing/2014/main" id="{D94FFA91-1CDF-CE98-2E29-625E29D01CE1}"/>
-              </a:ext>
-            </a:extLst>
-          </p:cNvPr>
-          <p:cNvSpPr/>
-          <p:nvPr/>
-        </p:nvSpPr>
-        <p:spPr>
-          <a:xfrm>
-            <a:off x="906093" y="2132230"/>
-            <a:ext cx="9471621" cy="2325470"/>
-          </a:xfrm>
-          <a:prstGeom prst="rect">
-            <a:avLst/>
-          </a:prstGeom>
-          <a:solidFill>
-            <a:srgbClr val="071739"/>
-          </a:solidFill>
-          <a:ln>
-            <a:noFill/>
-          </a:ln>
-        </p:spPr>
-        <p:style>
-          <a:lnRef idx="2">
-            <a:schemeClr val="accent1">
-              <a:shade val="15000"/>
-            </a:schemeClr>
-          </a:lnRef>
-          <a:fillRef idx="1">
-            <a:schemeClr val="accent1"/>
-          </a:fillRef>
-          <a:effectRef idx="0">
-            <a:schemeClr val="accent1"/>
-          </a:effectRef>
-          <a:fontRef idx="minor">
-            <a:schemeClr val="lt1"/>
-          </a:fontRef>
-        </p:style>
-        <p:txBody>
-          <a:bodyPr rtlCol="0" anchor="ctr"/>
-          <a:lstStyle/>
-          <a:p>
-            <a:pPr algn="ctr"/>
-            <a:endParaRPr lang="en-NZ"/>
-          </a:p>
-        </p:txBody>
-      </p:sp>
       <p:grpSp>
         <p:nvGrpSpPr>
-          <p:cNvPr id="12" name="Group 11">
-            <a:extLst>
-              <a:ext uri="{FF2B5EF4-FFF2-40B4-BE49-F238E27FC236}">
-                <a16:creationId xmlns:a16="http://schemas.microsoft.com/office/drawing/2014/main" id="{2CCB996E-82AD-1B75-9901-0400ADA45276}"/>
+          <p:cNvPr id="4" name="Group 3">
+            <a:extLst>
+              <a:ext uri="{FF2B5EF4-FFF2-40B4-BE49-F238E27FC236}">
+                <a16:creationId xmlns:a16="http://schemas.microsoft.com/office/drawing/2014/main" id="{6C4D959A-0507-852A-5440-E263D5D8DAB8}"/>
               </a:ext>
             </a:extLst>
           </p:cNvPr>
@@ -3889,188 +3837,261 @@
         </p:nvGrpSpPr>
         <p:grpSpPr>
           <a:xfrm>
-            <a:off x="906093" y="2132230"/>
-            <a:ext cx="9471621" cy="2325470"/>
-            <a:chOff x="744168" y="1103530"/>
-            <a:chExt cx="9471621" cy="2325470"/>
+            <a:off x="787400" y="1943100"/>
+            <a:ext cx="9893299" cy="2698750"/>
+            <a:chOff x="787400" y="1943100"/>
+            <a:chExt cx="9893299" cy="2698750"/>
           </a:xfrm>
         </p:grpSpPr>
-        <p:pic>
-          <p:nvPicPr>
-            <p:cNvPr id="13" name="Picture 12">
+        <p:sp>
+          <p:nvSpPr>
+            <p:cNvPr id="3" name="Rectangle: Rounded Corners 2">
               <a:extLst>
                 <a:ext uri="{FF2B5EF4-FFF2-40B4-BE49-F238E27FC236}">
-                  <a16:creationId xmlns:a16="http://schemas.microsoft.com/office/drawing/2014/main" id="{27CA3237-F533-5185-8913-F15A422460D9}"/>
+                  <a16:creationId xmlns:a16="http://schemas.microsoft.com/office/drawing/2014/main" id="{77D9F127-33E5-9CB5-A49B-D0EAFE07B2A4}"/>
                 </a:ext>
               </a:extLst>
             </p:cNvPr>
-            <p:cNvPicPr>
-              <a:picLocks noChangeAspect="1"/>
-            </p:cNvPicPr>
-            <p:nvPr/>
-          </p:nvPicPr>
-          <p:blipFill>
-            <a:blip r:embed="rId2">
-              <a:extLst>
-                <a:ext uri="{BEBA8EAE-BF5A-486C-A8C5-ECC9F3942E4B}">
-                  <a14:imgProps xmlns:a14="http://schemas.microsoft.com/office/drawing/2010/main">
-                    <a14:imgLayer r:embed="rId3">
-                      <a14:imgEffect>
-                        <a14:backgroundRemoval t="3299" b="95476" l="3485" r="94452">
-                          <a14:foregroundMark x1="33570" y1="32234" x2="33570" y2="32234"/>
-                          <a14:foregroundMark x1="48080" y1="3393" x2="48080" y2="3393"/>
-                          <a14:foregroundMark x1="8321" y1="47691" x2="8321" y2="47691"/>
-                          <a14:foregroundMark x1="4765" y1="48351" x2="4765" y2="48351"/>
-                          <a14:foregroundMark x1="3627" y1="48822" x2="3627" y2="48822"/>
-                          <a14:foregroundMark x1="27454" y1="62865" x2="27454" y2="62865"/>
-                          <a14:foregroundMark x1="32077" y1="63525" x2="32077" y2="63525"/>
-                          <a14:foregroundMark x1="28378" y1="57304" x2="28378" y2="57304"/>
-                          <a14:foregroundMark x1="36486" y1="66635" x2="36486" y2="66635"/>
-                          <a14:foregroundMark x1="38051" y1="71065" x2="38051" y2="71065"/>
-                          <a14:foregroundMark x1="63727" y1="76060" x2="63727" y2="76060"/>
-                          <a14:foregroundMark x1="50853" y1="95476" x2="50853" y2="95476"/>
-                          <a14:foregroundMark x1="36558" y1="66635" x2="36558" y2="66635"/>
-                          <a14:foregroundMark x1="37055" y1="63336" x2="37055" y2="63336"/>
-                          <a14:foregroundMark x1="33215" y1="70028" x2="33215" y2="70028"/>
-                          <a14:foregroundMark x1="64296" y1="31480" x2="63940" y2="31668"/>
-                          <a14:foregroundMark x1="74751" y1="39397" x2="74751" y2="39397"/>
-                          <a14:foregroundMark x1="94452" y1="48256" x2="94452" y2="48256"/>
-                        </a14:backgroundRemoval>
-                      </a14:imgEffect>
-                    </a14:imgLayer>
-                  </a14:imgProps>
-                </a:ext>
-              </a:extLst>
-            </a:blip>
-            <a:stretch>
-              <a:fillRect/>
-            </a:stretch>
-          </p:blipFill>
-          <p:spPr>
-            <a:xfrm>
-              <a:off x="744168" y="1103530"/>
-              <a:ext cx="3081631" cy="2325470"/>
-            </a:xfrm>
-            <a:prstGeom prst="rect">
-              <a:avLst/>
-            </a:prstGeom>
-            <a:noFill/>
-          </p:spPr>
-        </p:pic>
-        <p:sp>
-          <p:nvSpPr>
-            <p:cNvPr id="14" name="TextBox 13">
-              <a:extLst>
-                <a:ext uri="{FF2B5EF4-FFF2-40B4-BE49-F238E27FC236}">
-                  <a16:creationId xmlns:a16="http://schemas.microsoft.com/office/drawing/2014/main" id="{7FF209AA-088D-168B-6678-2AEFCB48E834}"/>
-                </a:ext>
-              </a:extLst>
-            </p:cNvPr>
-            <p:cNvSpPr txBox="1"/>
+            <p:cNvSpPr/>
             <p:nvPr/>
           </p:nvSpPr>
           <p:spPr>
             <a:xfrm>
-              <a:off x="4138569" y="1219110"/>
-              <a:ext cx="6077220" cy="1323439"/>
+              <a:off x="787400" y="1943100"/>
+              <a:ext cx="9893299" cy="2698750"/>
             </a:xfrm>
-            <a:prstGeom prst="rect">
+            <a:prstGeom prst="roundRect">
               <a:avLst/>
             </a:prstGeom>
-            <a:noFill/>
+            <a:solidFill>
+              <a:srgbClr val="071739"/>
+            </a:solidFill>
+            <a:ln>
+              <a:noFill/>
+            </a:ln>
           </p:spPr>
+          <p:style>
+            <a:lnRef idx="2">
+              <a:schemeClr val="accent1">
+                <a:shade val="15000"/>
+              </a:schemeClr>
+            </a:lnRef>
+            <a:fillRef idx="1">
+              <a:schemeClr val="accent1"/>
+            </a:fillRef>
+            <a:effectRef idx="0">
+              <a:schemeClr val="accent1"/>
+            </a:effectRef>
+            <a:fontRef idx="minor">
+              <a:schemeClr val="lt1"/>
+            </a:fontRef>
+          </p:style>
           <p:txBody>
-            <a:bodyPr wrap="square" spcCol="252000" rtlCol="0">
-              <a:spAutoFit/>
-            </a:bodyPr>
+            <a:bodyPr rtlCol="0" anchor="ctr"/>
             <a:lstStyle/>
             <a:p>
-              <a:r>
-                <a:rPr lang="en-NZ" sz="8000" spc="-300" dirty="0">
-                  <a:solidFill>
-                    <a:schemeClr val="bg1"/>
-                  </a:solidFill>
-                  <a:latin typeface="Cascadia Code SemiBold" panose="020B0609020000020004" pitchFamily="49" charset="0"/>
-                  <a:ea typeface="Cascadia Code SemiBold" panose="020B0609020000020004" pitchFamily="49" charset="0"/>
-                  <a:cs typeface="Cascadia Code SemiBold" panose="020B0609020000020004" pitchFamily="49" charset="0"/>
-                </a:rPr>
-                <a:t>SEA</a:t>
-              </a:r>
-              <a:r>
-                <a:rPr lang="en-NZ" sz="4800" spc="-300" dirty="0">
-                  <a:solidFill>
-                    <a:schemeClr val="bg1"/>
-                  </a:solidFill>
-                  <a:latin typeface="Cascadia Code SemiBold" panose="020B0609020000020004" pitchFamily="49" charset="0"/>
-                  <a:ea typeface="Cascadia Code SemiBold" panose="020B0609020000020004" pitchFamily="49" charset="0"/>
-                  <a:cs typeface="Cascadia Code SemiBold" panose="020B0609020000020004" pitchFamily="49" charset="0"/>
-                </a:rPr>
-                <a:t> </a:t>
-              </a:r>
-              <a:r>
-                <a:rPr lang="en-NZ" sz="8000" spc="-300" dirty="0">
-                  <a:solidFill>
-                    <a:schemeClr val="bg1"/>
-                  </a:solidFill>
-                  <a:latin typeface="Cascadia Code SemiBold" panose="020B0609020000020004" pitchFamily="49" charset="0"/>
-                  <a:ea typeface="Cascadia Code SemiBold" panose="020B0609020000020004" pitchFamily="49" charset="0"/>
-                  <a:cs typeface="Cascadia Code SemiBold" panose="020B0609020000020004" pitchFamily="49" charset="0"/>
-                </a:rPr>
-                <a:t>THROUGH</a:t>
-              </a:r>
+              <a:pPr algn="ctr"/>
+              <a:endParaRPr lang="en-NZ"/>
             </a:p>
           </p:txBody>
         </p:sp>
-        <p:sp>
-          <p:nvSpPr>
-            <p:cNvPr id="15" name="TextBox 14">
+        <p:grpSp>
+          <p:nvGrpSpPr>
+            <p:cNvPr id="12" name="Group 11">
               <a:extLst>
                 <a:ext uri="{FF2B5EF4-FFF2-40B4-BE49-F238E27FC236}">
-                  <a16:creationId xmlns:a16="http://schemas.microsoft.com/office/drawing/2014/main" id="{32DB40F3-33AA-1D66-ED1C-2AA08E4AC155}"/>
+                  <a16:creationId xmlns:a16="http://schemas.microsoft.com/office/drawing/2014/main" id="{2CCB996E-82AD-1B75-9901-0400ADA45276}"/>
                 </a:ext>
               </a:extLst>
             </p:cNvPr>
-            <p:cNvSpPr txBox="1"/>
+            <p:cNvGrpSpPr/>
             <p:nvPr/>
-          </p:nvSpPr>
-          <p:spPr>
+          </p:nvGrpSpPr>
+          <p:grpSpPr>
             <a:xfrm>
-              <a:off x="4138569" y="2342148"/>
-              <a:ext cx="5757906" cy="1015663"/>
+              <a:off x="906093" y="2132230"/>
+              <a:ext cx="9416757" cy="2325470"/>
+              <a:chOff x="744168" y="1103530"/>
+              <a:chExt cx="9416757" cy="2325470"/>
             </a:xfrm>
-            <a:prstGeom prst="rect">
-              <a:avLst/>
-            </a:prstGeom>
-            <a:noFill/>
-          </p:spPr>
-          <p:txBody>
-            <a:bodyPr wrap="square" spcCol="252000" rtlCol="0">
-              <a:spAutoFit/>
-            </a:bodyPr>
-            <a:lstStyle>
-              <a:defPPr>
-                <a:defRPr lang="en-US"/>
-              </a:defPPr>
-              <a:lvl1pPr>
-                <a:defRPr sz="4400">
-                  <a:latin typeface="Cascadia Code SemiBold" panose="020B0609020000020004" pitchFamily="49" charset="0"/>
-                  <a:ea typeface="Cascadia Code SemiBold" panose="020B0609020000020004" pitchFamily="49" charset="0"/>
-                  <a:cs typeface="Cascadia Code SemiBold" panose="020B0609020000020004" pitchFamily="49" charset="0"/>
-                </a:defRPr>
-              </a:lvl1pPr>
-            </a:lstStyle>
-            <a:p>
-              <a:r>
-                <a:rPr lang="en-NZ" sz="6000" spc="1000" dirty="0">
-                  <a:solidFill>
-                    <a:schemeClr val="bg1"/>
-                  </a:solidFill>
-                </a:rPr>
-                <a:t>SCIENCE</a:t>
-              </a:r>
-            </a:p>
-          </p:txBody>
-        </p:sp>
+          </p:grpSpPr>
+          <p:pic>
+            <p:nvPicPr>
+              <p:cNvPr id="13" name="Picture 12">
+                <a:extLst>
+                  <a:ext uri="{FF2B5EF4-FFF2-40B4-BE49-F238E27FC236}">
+                    <a16:creationId xmlns:a16="http://schemas.microsoft.com/office/drawing/2014/main" id="{27CA3237-F533-5185-8913-F15A422460D9}"/>
+                  </a:ext>
+                </a:extLst>
+              </p:cNvPr>
+              <p:cNvPicPr>
+                <a:picLocks noChangeAspect="1"/>
+              </p:cNvPicPr>
+              <p:nvPr/>
+            </p:nvPicPr>
+            <p:blipFill>
+              <a:blip r:embed="rId2">
+                <a:extLst>
+                  <a:ext uri="{BEBA8EAE-BF5A-486C-A8C5-ECC9F3942E4B}">
+                    <a14:imgProps xmlns:a14="http://schemas.microsoft.com/office/drawing/2010/main">
+                      <a14:imgLayer r:embed="rId3">
+                        <a14:imgEffect>
+                          <a14:backgroundRemoval t="3299" b="95476" l="3485" r="94452">
+                            <a14:foregroundMark x1="33570" y1="32234" x2="33570" y2="32234"/>
+                            <a14:foregroundMark x1="48080" y1="3393" x2="48080" y2="3393"/>
+                            <a14:foregroundMark x1="8321" y1="47691" x2="8321" y2="47691"/>
+                            <a14:foregroundMark x1="4765" y1="48351" x2="4765" y2="48351"/>
+                            <a14:foregroundMark x1="3627" y1="48822" x2="3627" y2="48822"/>
+                            <a14:foregroundMark x1="27454" y1="62865" x2="27454" y2="62865"/>
+                            <a14:foregroundMark x1="32077" y1="63525" x2="32077" y2="63525"/>
+                            <a14:foregroundMark x1="28378" y1="57304" x2="28378" y2="57304"/>
+                            <a14:foregroundMark x1="36486" y1="66635" x2="36486" y2="66635"/>
+                            <a14:foregroundMark x1="38051" y1="71065" x2="38051" y2="71065"/>
+                            <a14:foregroundMark x1="63727" y1="76060" x2="63727" y2="76060"/>
+                            <a14:foregroundMark x1="50853" y1="95476" x2="50853" y2="95476"/>
+                            <a14:foregroundMark x1="36558" y1="66635" x2="36558" y2="66635"/>
+                            <a14:foregroundMark x1="37055" y1="63336" x2="37055" y2="63336"/>
+                            <a14:foregroundMark x1="33215" y1="70028" x2="33215" y2="70028"/>
+                            <a14:foregroundMark x1="64296" y1="31480" x2="63940" y2="31668"/>
+                            <a14:foregroundMark x1="74751" y1="39397" x2="74751" y2="39397"/>
+                            <a14:foregroundMark x1="94452" y1="48256" x2="94452" y2="48256"/>
+                          </a14:backgroundRemoval>
+                        </a14:imgEffect>
+                      </a14:imgLayer>
+                    </a14:imgProps>
+                  </a:ext>
+                </a:extLst>
+              </a:blip>
+              <a:stretch>
+                <a:fillRect/>
+              </a:stretch>
+            </p:blipFill>
+            <p:spPr>
+              <a:xfrm>
+                <a:off x="744168" y="1103530"/>
+                <a:ext cx="3081631" cy="2325470"/>
+              </a:xfrm>
+              <a:prstGeom prst="rect">
+                <a:avLst/>
+              </a:prstGeom>
+              <a:noFill/>
+            </p:spPr>
+          </p:pic>
+          <p:sp>
+            <p:nvSpPr>
+              <p:cNvPr id="14" name="TextBox 13">
+                <a:extLst>
+                  <a:ext uri="{FF2B5EF4-FFF2-40B4-BE49-F238E27FC236}">
+                    <a16:creationId xmlns:a16="http://schemas.microsoft.com/office/drawing/2014/main" id="{7FF209AA-088D-168B-6678-2AEFCB48E834}"/>
+                  </a:ext>
+                </a:extLst>
+              </p:cNvPr>
+              <p:cNvSpPr txBox="1"/>
+              <p:nvPr/>
+            </p:nvSpPr>
+            <p:spPr>
+              <a:xfrm>
+                <a:off x="4083705" y="1161960"/>
+                <a:ext cx="6077220" cy="1323439"/>
+              </a:xfrm>
+              <a:prstGeom prst="rect">
+                <a:avLst/>
+              </a:prstGeom>
+              <a:noFill/>
+            </p:spPr>
+            <p:txBody>
+              <a:bodyPr wrap="square" spcCol="252000" rtlCol="0">
+                <a:spAutoFit/>
+              </a:bodyPr>
+              <a:lstStyle/>
+              <a:p>
+                <a:r>
+                  <a:rPr lang="en-NZ" sz="8000" spc="-300" dirty="0">
+                    <a:solidFill>
+                      <a:schemeClr val="bg1"/>
+                    </a:solidFill>
+                    <a:latin typeface="Cascadia Code SemiBold" panose="020B0609020000020004" pitchFamily="49" charset="0"/>
+                    <a:ea typeface="Cascadia Code SemiBold" panose="020B0609020000020004" pitchFamily="49" charset="0"/>
+                    <a:cs typeface="Cascadia Code SemiBold" panose="020B0609020000020004" pitchFamily="49" charset="0"/>
+                  </a:rPr>
+                  <a:t>SEA</a:t>
+                </a:r>
+                <a:r>
+                  <a:rPr lang="en-NZ" sz="4800" spc="-300" dirty="0">
+                    <a:solidFill>
+                      <a:schemeClr val="bg1"/>
+                    </a:solidFill>
+                    <a:latin typeface="Cascadia Code SemiBold" panose="020B0609020000020004" pitchFamily="49" charset="0"/>
+                    <a:ea typeface="Cascadia Code SemiBold" panose="020B0609020000020004" pitchFamily="49" charset="0"/>
+                    <a:cs typeface="Cascadia Code SemiBold" panose="020B0609020000020004" pitchFamily="49" charset="0"/>
+                  </a:rPr>
+                  <a:t> </a:t>
+                </a:r>
+                <a:r>
+                  <a:rPr lang="en-NZ" sz="8000" spc="-300" dirty="0">
+                    <a:solidFill>
+                      <a:schemeClr val="bg1"/>
+                    </a:solidFill>
+                    <a:latin typeface="Cascadia Code SemiBold" panose="020B0609020000020004" pitchFamily="49" charset="0"/>
+                    <a:ea typeface="Cascadia Code SemiBold" panose="020B0609020000020004" pitchFamily="49" charset="0"/>
+                    <a:cs typeface="Cascadia Code SemiBold" panose="020B0609020000020004" pitchFamily="49" charset="0"/>
+                  </a:rPr>
+                  <a:t>THROUGH</a:t>
+                </a:r>
+              </a:p>
+            </p:txBody>
+          </p:sp>
+          <p:sp>
+            <p:nvSpPr>
+              <p:cNvPr id="15" name="TextBox 14">
+                <a:extLst>
+                  <a:ext uri="{FF2B5EF4-FFF2-40B4-BE49-F238E27FC236}">
+                    <a16:creationId xmlns:a16="http://schemas.microsoft.com/office/drawing/2014/main" id="{32DB40F3-33AA-1D66-ED1C-2AA08E4AC155}"/>
+                  </a:ext>
+                </a:extLst>
+              </p:cNvPr>
+              <p:cNvSpPr txBox="1"/>
+              <p:nvPr/>
+            </p:nvSpPr>
+            <p:spPr>
+              <a:xfrm>
+                <a:off x="4083705" y="2291348"/>
+                <a:ext cx="5757906" cy="1015663"/>
+              </a:xfrm>
+              <a:prstGeom prst="rect">
+                <a:avLst/>
+              </a:prstGeom>
+              <a:noFill/>
+            </p:spPr>
+            <p:txBody>
+              <a:bodyPr wrap="square" spcCol="252000" rtlCol="0">
+                <a:spAutoFit/>
+              </a:bodyPr>
+              <a:lstStyle>
+                <a:defPPr>
+                  <a:defRPr lang="en-US"/>
+                </a:defPPr>
+                <a:lvl1pPr>
+                  <a:defRPr sz="4400">
+                    <a:latin typeface="Cascadia Code SemiBold" panose="020B0609020000020004" pitchFamily="49" charset="0"/>
+                    <a:ea typeface="Cascadia Code SemiBold" panose="020B0609020000020004" pitchFamily="49" charset="0"/>
+                    <a:cs typeface="Cascadia Code SemiBold" panose="020B0609020000020004" pitchFamily="49" charset="0"/>
+                  </a:defRPr>
+                </a:lvl1pPr>
+              </a:lstStyle>
+              <a:p>
+                <a:r>
+                  <a:rPr lang="en-NZ" sz="6000" spc="1000" dirty="0">
+                    <a:solidFill>
+                      <a:schemeClr val="bg1"/>
+                    </a:solidFill>
+                  </a:rPr>
+                  <a:t>SCIENCE</a:t>
+                </a:r>
+              </a:p>
+            </p:txBody>
+          </p:sp>
+        </p:grpSp>
       </p:grpSp>
     </p:spTree>
     <p:extLst>

</xml_diff>

<commit_message>
go dark; change colours of transition plot
</commit_message>
<xml_diff>
--- a/logo/brand.pptx
+++ b/logo/brand.pptx
@@ -10,6 +10,7 @@
     <p:sldId id="260" r:id="rId4"/>
     <p:sldId id="261" r:id="rId5"/>
     <p:sldId id="262" r:id="rId6"/>
+    <p:sldId id="263" r:id="rId7"/>
   </p:sldIdLst>
   <p:sldSz cx="12192000" cy="6858000"/>
   <p:notesSz cx="6858000" cy="9144000"/>
@@ -4582,6 +4583,274 @@
 </p:sld>
 </file>
 
+<file path=ppt/slides/slide6.xml><?xml version="1.0" encoding="utf-8"?>
+<p:sld xmlns:a="http://schemas.openxmlformats.org/drawingml/2006/main" xmlns:r="http://schemas.openxmlformats.org/officeDocument/2006/relationships" xmlns:p="http://schemas.openxmlformats.org/presentationml/2006/main">
+  <p:cSld>
+    <p:spTree>
+      <p:nvGrpSpPr>
+        <p:cNvPr id="1" name=""/>
+        <p:cNvGrpSpPr/>
+        <p:nvPr/>
+      </p:nvGrpSpPr>
+      <p:grpSpPr>
+        <a:xfrm>
+          <a:off x="0" y="0"/>
+          <a:ext cx="0" cy="0"/>
+          <a:chOff x="0" y="0"/>
+          <a:chExt cx="0" cy="0"/>
+        </a:xfrm>
+      </p:grpSpPr>
+      <p:pic>
+        <p:nvPicPr>
+          <p:cNvPr id="5" name="Picture 4">
+            <a:extLst>
+              <a:ext uri="{FF2B5EF4-FFF2-40B4-BE49-F238E27FC236}">
+                <a16:creationId xmlns:a16="http://schemas.microsoft.com/office/drawing/2014/main" id="{E29070D7-6B7D-7D28-7F70-4EB8492F02AD}"/>
+              </a:ext>
+            </a:extLst>
+          </p:cNvPr>
+          <p:cNvPicPr>
+            <a:picLocks noChangeAspect="1"/>
+          </p:cNvPicPr>
+          <p:nvPr/>
+        </p:nvPicPr>
+        <p:blipFill>
+          <a:blip r:embed="rId2"/>
+          <a:stretch>
+            <a:fillRect/>
+          </a:stretch>
+        </p:blipFill>
+        <p:spPr>
+          <a:xfrm>
+            <a:off x="1440564" y="1068082"/>
+            <a:ext cx="9148466" cy="1619024"/>
+          </a:xfrm>
+          <a:prstGeom prst="rect">
+            <a:avLst/>
+          </a:prstGeom>
+        </p:spPr>
+      </p:pic>
+      <p:sp>
+        <p:nvSpPr>
+          <p:cNvPr id="6" name="Rectangle 5">
+            <a:extLst>
+              <a:ext uri="{FF2B5EF4-FFF2-40B4-BE49-F238E27FC236}">
+                <a16:creationId xmlns:a16="http://schemas.microsoft.com/office/drawing/2014/main" id="{08684C6B-3D30-1262-52D5-BAF517090330}"/>
+              </a:ext>
+            </a:extLst>
+          </p:cNvPr>
+          <p:cNvSpPr/>
+          <p:nvPr/>
+        </p:nvSpPr>
+        <p:spPr>
+          <a:xfrm>
+            <a:off x="1582911" y="3429000"/>
+            <a:ext cx="1790380" cy="1175657"/>
+          </a:xfrm>
+          <a:prstGeom prst="rect">
+            <a:avLst/>
+          </a:prstGeom>
+          <a:solidFill>
+            <a:srgbClr val="00BC8C"/>
+          </a:solidFill>
+        </p:spPr>
+        <p:style>
+          <a:lnRef idx="2">
+            <a:schemeClr val="accent1">
+              <a:shade val="15000"/>
+            </a:schemeClr>
+          </a:lnRef>
+          <a:fillRef idx="1">
+            <a:schemeClr val="accent1"/>
+          </a:fillRef>
+          <a:effectRef idx="0">
+            <a:schemeClr val="accent1"/>
+          </a:effectRef>
+          <a:fontRef idx="minor">
+            <a:schemeClr val="lt1"/>
+          </a:fontRef>
+        </p:style>
+        <p:txBody>
+          <a:bodyPr rtlCol="0" anchor="ctr"/>
+          <a:lstStyle/>
+          <a:p>
+            <a:pPr algn="ctr"/>
+            <a:r>
+              <a:rPr lang="en-NZ" dirty="0"/>
+              <a:t>#00BC8C</a:t>
+            </a:r>
+          </a:p>
+        </p:txBody>
+      </p:sp>
+      <p:sp>
+        <p:nvSpPr>
+          <p:cNvPr id="7" name="Rectangle 6">
+            <a:extLst>
+              <a:ext uri="{FF2B5EF4-FFF2-40B4-BE49-F238E27FC236}">
+                <a16:creationId xmlns:a16="http://schemas.microsoft.com/office/drawing/2014/main" id="{178891B1-3DFA-FE32-8AC1-AAC2750ACD40}"/>
+              </a:ext>
+            </a:extLst>
+          </p:cNvPr>
+          <p:cNvSpPr/>
+          <p:nvPr/>
+        </p:nvSpPr>
+        <p:spPr>
+          <a:xfrm>
+            <a:off x="3820887" y="3428997"/>
+            <a:ext cx="1790380" cy="1175657"/>
+          </a:xfrm>
+          <a:prstGeom prst="rect">
+            <a:avLst/>
+          </a:prstGeom>
+          <a:solidFill>
+            <a:srgbClr val="3498DB"/>
+          </a:solidFill>
+        </p:spPr>
+        <p:style>
+          <a:lnRef idx="2">
+            <a:schemeClr val="accent1">
+              <a:shade val="15000"/>
+            </a:schemeClr>
+          </a:lnRef>
+          <a:fillRef idx="1">
+            <a:schemeClr val="accent1"/>
+          </a:fillRef>
+          <a:effectRef idx="0">
+            <a:schemeClr val="accent1"/>
+          </a:effectRef>
+          <a:fontRef idx="minor">
+            <a:schemeClr val="lt1"/>
+          </a:fontRef>
+        </p:style>
+        <p:txBody>
+          <a:bodyPr rtlCol="0" anchor="ctr"/>
+          <a:lstStyle/>
+          <a:p>
+            <a:pPr algn="ctr"/>
+            <a:r>
+              <a:rPr lang="en-NZ" dirty="0"/>
+              <a:t>#3498DB</a:t>
+            </a:r>
+          </a:p>
+        </p:txBody>
+      </p:sp>
+      <p:sp>
+        <p:nvSpPr>
+          <p:cNvPr id="8" name="Rectangle 7">
+            <a:extLst>
+              <a:ext uri="{FF2B5EF4-FFF2-40B4-BE49-F238E27FC236}">
+                <a16:creationId xmlns:a16="http://schemas.microsoft.com/office/drawing/2014/main" id="{00E8F8E0-1441-5384-83BF-95BB22844E74}"/>
+              </a:ext>
+            </a:extLst>
+          </p:cNvPr>
+          <p:cNvSpPr/>
+          <p:nvPr/>
+        </p:nvSpPr>
+        <p:spPr>
+          <a:xfrm>
+            <a:off x="5958968" y="3428998"/>
+            <a:ext cx="1790380" cy="1175657"/>
+          </a:xfrm>
+          <a:prstGeom prst="rect">
+            <a:avLst/>
+          </a:prstGeom>
+          <a:solidFill>
+            <a:srgbClr val="F39C12"/>
+          </a:solidFill>
+        </p:spPr>
+        <p:style>
+          <a:lnRef idx="2">
+            <a:schemeClr val="accent1">
+              <a:shade val="15000"/>
+            </a:schemeClr>
+          </a:lnRef>
+          <a:fillRef idx="1">
+            <a:schemeClr val="accent1"/>
+          </a:fillRef>
+          <a:effectRef idx="0">
+            <a:schemeClr val="accent1"/>
+          </a:effectRef>
+          <a:fontRef idx="minor">
+            <a:schemeClr val="lt1"/>
+          </a:fontRef>
+        </p:style>
+        <p:txBody>
+          <a:bodyPr rtlCol="0" anchor="ctr"/>
+          <a:lstStyle/>
+          <a:p>
+            <a:pPr algn="ctr"/>
+            <a:r>
+              <a:rPr lang="en-NZ" dirty="0"/>
+              <a:t>#F39C12</a:t>
+            </a:r>
+          </a:p>
+        </p:txBody>
+      </p:sp>
+      <p:sp>
+        <p:nvSpPr>
+          <p:cNvPr id="9" name="Rectangle 8">
+            <a:extLst>
+              <a:ext uri="{FF2B5EF4-FFF2-40B4-BE49-F238E27FC236}">
+                <a16:creationId xmlns:a16="http://schemas.microsoft.com/office/drawing/2014/main" id="{C5112E66-E9CD-EFDB-E3F6-3F6590BEC09B}"/>
+              </a:ext>
+            </a:extLst>
+          </p:cNvPr>
+          <p:cNvSpPr/>
+          <p:nvPr/>
+        </p:nvSpPr>
+        <p:spPr>
+          <a:xfrm>
+            <a:off x="8444751" y="3428997"/>
+            <a:ext cx="1790380" cy="1175657"/>
+          </a:xfrm>
+          <a:prstGeom prst="rect">
+            <a:avLst/>
+          </a:prstGeom>
+          <a:solidFill>
+            <a:srgbClr val="E74C3C"/>
+          </a:solidFill>
+        </p:spPr>
+        <p:style>
+          <a:lnRef idx="2">
+            <a:schemeClr val="accent1">
+              <a:shade val="15000"/>
+            </a:schemeClr>
+          </a:lnRef>
+          <a:fillRef idx="1">
+            <a:schemeClr val="accent1"/>
+          </a:fillRef>
+          <a:effectRef idx="0">
+            <a:schemeClr val="accent1"/>
+          </a:effectRef>
+          <a:fontRef idx="minor">
+            <a:schemeClr val="lt1"/>
+          </a:fontRef>
+        </p:style>
+        <p:txBody>
+          <a:bodyPr rtlCol="0" anchor="ctr"/>
+          <a:lstStyle/>
+          <a:p>
+            <a:pPr algn="ctr"/>
+            <a:r>
+              <a:rPr lang="en-NZ" dirty="0"/>
+              <a:t>#E74C3C</a:t>
+            </a:r>
+          </a:p>
+        </p:txBody>
+      </p:sp>
+    </p:spTree>
+    <p:extLst>
+      <p:ext uri="{BB962C8B-B14F-4D97-AF65-F5344CB8AC3E}">
+        <p14:creationId xmlns:p14="http://schemas.microsoft.com/office/powerpoint/2010/main" val="1427962379"/>
+      </p:ext>
+    </p:extLst>
+  </p:cSld>
+  <p:clrMapOvr>
+    <a:masterClrMapping/>
+  </p:clrMapOvr>
+</p:sld>
+</file>
+
 <file path=ppt/theme/theme1.xml><?xml version="1.0" encoding="utf-8"?>
 <a:theme xmlns:a="http://schemas.openxmlformats.org/drawingml/2006/main" name="Office Theme">
   <a:themeElements>

</xml_diff>